<commit_message>
Update Final Project PPT DATS 6101.pptx
</commit_message>
<xml_diff>
--- a/FINAL_PROJECT/Final Project PPT DATS 6101.pptx
+++ b/FINAL_PROJECT/Final Project PPT DATS 6101.pptx
@@ -5,7 +5,7 @@
     <p:sldMasterId id="2147483660" r:id="rId1"/>
   </p:sldMasterIdLst>
   <p:notesMasterIdLst>
-    <p:notesMasterId r:id="rId17"/>
+    <p:notesMasterId r:id="rId18"/>
   </p:notesMasterIdLst>
   <p:sldIdLst>
     <p:sldId id="256" r:id="rId2"/>
@@ -22,7 +22,8 @@
     <p:sldId id="278" r:id="rId13"/>
     <p:sldId id="279" r:id="rId14"/>
     <p:sldId id="280" r:id="rId15"/>
-    <p:sldId id="269" r:id="rId16"/>
+    <p:sldId id="281" r:id="rId16"/>
+    <p:sldId id="269" r:id="rId17"/>
   </p:sldIdLst>
   <p:sldSz cx="12192000" cy="6858000"/>
   <p:notesSz cx="6858000" cy="9144000"/>
@@ -211,7 +212,7 @@
           <a:p>
             <a:fld id="{9F7B77B6-A42E-A048-A74D-7373B9F65E74}" type="datetimeFigureOut">
               <a:rPr lang="en-US" smtClean="0"/>
-              <a:t>12/10/2022</a:t>
+              <a:t>12/11/2022</a:t>
             </a:fld>
             <a:endParaRPr lang="en-US"/>
           </a:p>
@@ -777,7 +778,7 @@
           <a:p>
             <a:fld id="{5DCE9035-4A16-5448-9596-651BFBF89D25}" type="datetimeFigureOut">
               <a:rPr lang="en-US" smtClean="0"/>
-              <a:t>12/10/2022</a:t>
+              <a:t>12/11/2022</a:t>
             </a:fld>
             <a:endParaRPr lang="en-US"/>
           </a:p>
@@ -947,7 +948,7 @@
           <a:p>
             <a:fld id="{5DCE9035-4A16-5448-9596-651BFBF89D25}" type="datetimeFigureOut">
               <a:rPr lang="en-US" smtClean="0"/>
-              <a:t>12/10/2022</a:t>
+              <a:t>12/11/2022</a:t>
             </a:fld>
             <a:endParaRPr lang="en-US"/>
           </a:p>
@@ -1127,7 +1128,7 @@
           <a:p>
             <a:fld id="{5DCE9035-4A16-5448-9596-651BFBF89D25}" type="datetimeFigureOut">
               <a:rPr lang="en-US" smtClean="0"/>
-              <a:t>12/10/2022</a:t>
+              <a:t>12/11/2022</a:t>
             </a:fld>
             <a:endParaRPr lang="en-US"/>
           </a:p>
@@ -1297,7 +1298,7 @@
           <a:p>
             <a:fld id="{5DCE9035-4A16-5448-9596-651BFBF89D25}" type="datetimeFigureOut">
               <a:rPr lang="en-US" smtClean="0"/>
-              <a:t>12/10/2022</a:t>
+              <a:t>12/11/2022</a:t>
             </a:fld>
             <a:endParaRPr lang="en-US"/>
           </a:p>
@@ -1543,7 +1544,7 @@
           <a:p>
             <a:fld id="{5DCE9035-4A16-5448-9596-651BFBF89D25}" type="datetimeFigureOut">
               <a:rPr lang="en-US" smtClean="0"/>
-              <a:t>12/10/2022</a:t>
+              <a:t>12/11/2022</a:t>
             </a:fld>
             <a:endParaRPr lang="en-US"/>
           </a:p>
@@ -1775,7 +1776,7 @@
           <a:p>
             <a:fld id="{5DCE9035-4A16-5448-9596-651BFBF89D25}" type="datetimeFigureOut">
               <a:rPr lang="en-US" smtClean="0"/>
-              <a:t>12/10/2022</a:t>
+              <a:t>12/11/2022</a:t>
             </a:fld>
             <a:endParaRPr lang="en-US"/>
           </a:p>
@@ -2142,7 +2143,7 @@
           <a:p>
             <a:fld id="{5DCE9035-4A16-5448-9596-651BFBF89D25}" type="datetimeFigureOut">
               <a:rPr lang="en-US" smtClean="0"/>
-              <a:t>12/10/2022</a:t>
+              <a:t>12/11/2022</a:t>
             </a:fld>
             <a:endParaRPr lang="en-US"/>
           </a:p>
@@ -2260,7 +2261,7 @@
           <a:p>
             <a:fld id="{5DCE9035-4A16-5448-9596-651BFBF89D25}" type="datetimeFigureOut">
               <a:rPr lang="en-US" smtClean="0"/>
-              <a:t>12/10/2022</a:t>
+              <a:t>12/11/2022</a:t>
             </a:fld>
             <a:endParaRPr lang="en-US"/>
           </a:p>
@@ -2355,7 +2356,7 @@
           <a:p>
             <a:fld id="{5DCE9035-4A16-5448-9596-651BFBF89D25}" type="datetimeFigureOut">
               <a:rPr lang="en-US" smtClean="0"/>
-              <a:t>12/10/2022</a:t>
+              <a:t>12/11/2022</a:t>
             </a:fld>
             <a:endParaRPr lang="en-US"/>
           </a:p>
@@ -2632,7 +2633,7 @@
           <a:p>
             <a:fld id="{5DCE9035-4A16-5448-9596-651BFBF89D25}" type="datetimeFigureOut">
               <a:rPr lang="en-US" smtClean="0"/>
-              <a:t>12/10/2022</a:t>
+              <a:t>12/11/2022</a:t>
             </a:fld>
             <a:endParaRPr lang="en-US"/>
           </a:p>
@@ -2889,7 +2890,7 @@
           <a:p>
             <a:fld id="{5DCE9035-4A16-5448-9596-651BFBF89D25}" type="datetimeFigureOut">
               <a:rPr lang="en-US" smtClean="0"/>
-              <a:t>12/10/2022</a:t>
+              <a:t>12/11/2022</a:t>
             </a:fld>
             <a:endParaRPr lang="en-US"/>
           </a:p>
@@ -3102,7 +3103,7 @@
           <a:p>
             <a:fld id="{5DCE9035-4A16-5448-9596-651BFBF89D25}" type="datetimeFigureOut">
               <a:rPr lang="en-US" smtClean="0"/>
-              <a:t>12/10/2022</a:t>
+              <a:t>12/11/2022</a:t>
             </a:fld>
             <a:endParaRPr lang="en-US"/>
           </a:p>
@@ -4348,14 +4349,294 @@
         </p:blipFill>
         <p:spPr>
           <a:xfrm>
-            <a:off x="1600200" y="1246396"/>
-            <a:ext cx="4094018" cy="4930567"/>
+            <a:off x="2247902" y="1249456"/>
+            <a:ext cx="4353790" cy="5243419"/>
           </a:xfrm>
           <a:prstGeom prst="rect">
             <a:avLst/>
           </a:prstGeom>
         </p:spPr>
       </p:pic>
+      <p:sp>
+        <p:nvSpPr>
+          <p:cNvPr id="6" name="TextBox 5">
+            <a:extLst>
+              <a:ext uri="{FF2B5EF4-FFF2-40B4-BE49-F238E27FC236}">
+                <a16:creationId xmlns:a16="http://schemas.microsoft.com/office/drawing/2014/main" id="{41B64C8B-5DD9-F051-AD2A-6A32F378740E}"/>
+              </a:ext>
+            </a:extLst>
+          </p:cNvPr>
+          <p:cNvSpPr txBox="1"/>
+          <p:nvPr/>
+        </p:nvSpPr>
+        <p:spPr>
+          <a:xfrm>
+            <a:off x="467670" y="1302487"/>
+            <a:ext cx="1610590" cy="369332"/>
+          </a:xfrm>
+          <a:prstGeom prst="rect">
+            <a:avLst/>
+          </a:prstGeom>
+          <a:noFill/>
+        </p:spPr>
+        <p:txBody>
+          <a:bodyPr wrap="square" rtlCol="0">
+            <a:spAutoFit/>
+          </a:bodyPr>
+          <a:lstStyle/>
+          <a:p>
+            <a:r>
+              <a:rPr lang="en-US" dirty="0"/>
+              <a:t>New State A:</a:t>
+            </a:r>
+          </a:p>
+        </p:txBody>
+      </p:sp>
+      <p:sp>
+        <p:nvSpPr>
+          <p:cNvPr id="7" name="TextBox 6">
+            <a:extLst>
+              <a:ext uri="{FF2B5EF4-FFF2-40B4-BE49-F238E27FC236}">
+                <a16:creationId xmlns:a16="http://schemas.microsoft.com/office/drawing/2014/main" id="{2175AF6F-6EE1-AED5-FF33-171F5F041A53}"/>
+              </a:ext>
+            </a:extLst>
+          </p:cNvPr>
+          <p:cNvSpPr txBox="1"/>
+          <p:nvPr/>
+        </p:nvSpPr>
+        <p:spPr>
+          <a:xfrm>
+            <a:off x="473655" y="2007408"/>
+            <a:ext cx="1384738" cy="369332"/>
+          </a:xfrm>
+          <a:prstGeom prst="rect">
+            <a:avLst/>
+          </a:prstGeom>
+          <a:noFill/>
+        </p:spPr>
+        <p:txBody>
+          <a:bodyPr wrap="none" rtlCol="0">
+            <a:spAutoFit/>
+          </a:bodyPr>
+          <a:lstStyle/>
+          <a:p>
+            <a:r>
+              <a:rPr lang="en-US" dirty="0"/>
+              <a:t>New State B:</a:t>
+            </a:r>
+          </a:p>
+        </p:txBody>
+      </p:sp>
+      <p:sp>
+        <p:nvSpPr>
+          <p:cNvPr id="8" name="TextBox 7">
+            <a:extLst>
+              <a:ext uri="{FF2B5EF4-FFF2-40B4-BE49-F238E27FC236}">
+                <a16:creationId xmlns:a16="http://schemas.microsoft.com/office/drawing/2014/main" id="{43989CA2-CA1B-3859-50C7-9440EE7FEAE9}"/>
+              </a:ext>
+            </a:extLst>
+          </p:cNvPr>
+          <p:cNvSpPr txBox="1"/>
+          <p:nvPr/>
+        </p:nvSpPr>
+        <p:spPr>
+          <a:xfrm>
+            <a:off x="466728" y="2675087"/>
+            <a:ext cx="1745672" cy="369332"/>
+          </a:xfrm>
+          <a:prstGeom prst="rect">
+            <a:avLst/>
+          </a:prstGeom>
+          <a:noFill/>
+        </p:spPr>
+        <p:txBody>
+          <a:bodyPr wrap="square" rtlCol="0">
+            <a:spAutoFit/>
+          </a:bodyPr>
+          <a:lstStyle/>
+          <a:p>
+            <a:r>
+              <a:rPr lang="en-US" dirty="0"/>
+              <a:t>New State C:</a:t>
+            </a:r>
+          </a:p>
+        </p:txBody>
+      </p:sp>
+      <p:sp>
+        <p:nvSpPr>
+          <p:cNvPr id="9" name="TextBox 8">
+            <a:extLst>
+              <a:ext uri="{FF2B5EF4-FFF2-40B4-BE49-F238E27FC236}">
+                <a16:creationId xmlns:a16="http://schemas.microsoft.com/office/drawing/2014/main" id="{4005F759-9625-C763-B7EA-BA677B6AD9FC}"/>
+              </a:ext>
+            </a:extLst>
+          </p:cNvPr>
+          <p:cNvSpPr txBox="1"/>
+          <p:nvPr/>
+        </p:nvSpPr>
+        <p:spPr>
+          <a:xfrm>
+            <a:off x="470191" y="3342766"/>
+            <a:ext cx="1441890" cy="369332"/>
+          </a:xfrm>
+          <a:prstGeom prst="rect">
+            <a:avLst/>
+          </a:prstGeom>
+          <a:noFill/>
+        </p:spPr>
+        <p:txBody>
+          <a:bodyPr wrap="square" rtlCol="0">
+            <a:spAutoFit/>
+          </a:bodyPr>
+          <a:lstStyle/>
+          <a:p>
+            <a:r>
+              <a:rPr lang="en-US" dirty="0"/>
+              <a:t>New State D:</a:t>
+            </a:r>
+          </a:p>
+        </p:txBody>
+      </p:sp>
+      <p:sp>
+        <p:nvSpPr>
+          <p:cNvPr id="10" name="TextBox 9">
+            <a:extLst>
+              <a:ext uri="{FF2B5EF4-FFF2-40B4-BE49-F238E27FC236}">
+                <a16:creationId xmlns:a16="http://schemas.microsoft.com/office/drawing/2014/main" id="{19674BC6-3366-790A-8506-07B0F3903C07}"/>
+              </a:ext>
+            </a:extLst>
+          </p:cNvPr>
+          <p:cNvSpPr txBox="1"/>
+          <p:nvPr/>
+        </p:nvSpPr>
+        <p:spPr>
+          <a:xfrm>
+            <a:off x="473655" y="4014951"/>
+            <a:ext cx="1441890" cy="369332"/>
+          </a:xfrm>
+          <a:prstGeom prst="rect">
+            <a:avLst/>
+          </a:prstGeom>
+          <a:noFill/>
+        </p:spPr>
+        <p:txBody>
+          <a:bodyPr wrap="square" rtlCol="0">
+            <a:spAutoFit/>
+          </a:bodyPr>
+          <a:lstStyle/>
+          <a:p>
+            <a:r>
+              <a:rPr lang="en-US" dirty="0"/>
+              <a:t>New State E: </a:t>
+            </a:r>
+          </a:p>
+        </p:txBody>
+      </p:sp>
+      <p:sp>
+        <p:nvSpPr>
+          <p:cNvPr id="11" name="TextBox 10">
+            <a:extLst>
+              <a:ext uri="{FF2B5EF4-FFF2-40B4-BE49-F238E27FC236}">
+                <a16:creationId xmlns:a16="http://schemas.microsoft.com/office/drawing/2014/main" id="{B42339C9-2A6E-5A69-EE97-A07A54A9EF34}"/>
+              </a:ext>
+            </a:extLst>
+          </p:cNvPr>
+          <p:cNvSpPr txBox="1"/>
+          <p:nvPr/>
+        </p:nvSpPr>
+        <p:spPr>
+          <a:xfrm>
+            <a:off x="463264" y="4682630"/>
+            <a:ext cx="1745672" cy="369332"/>
+          </a:xfrm>
+          <a:prstGeom prst="rect">
+            <a:avLst/>
+          </a:prstGeom>
+          <a:noFill/>
+        </p:spPr>
+        <p:txBody>
+          <a:bodyPr wrap="square" rtlCol="0">
+            <a:spAutoFit/>
+          </a:bodyPr>
+          <a:lstStyle/>
+          <a:p>
+            <a:r>
+              <a:rPr lang="en-US" dirty="0"/>
+              <a:t>New State F:</a:t>
+            </a:r>
+          </a:p>
+        </p:txBody>
+      </p:sp>
+      <p:sp>
+        <p:nvSpPr>
+          <p:cNvPr id="12" name="TextBox 11">
+            <a:extLst>
+              <a:ext uri="{FF2B5EF4-FFF2-40B4-BE49-F238E27FC236}">
+                <a16:creationId xmlns:a16="http://schemas.microsoft.com/office/drawing/2014/main" id="{A4AC577F-1380-BFF8-BDA3-BE53440F86EA}"/>
+              </a:ext>
+            </a:extLst>
+          </p:cNvPr>
+          <p:cNvSpPr txBox="1"/>
+          <p:nvPr/>
+        </p:nvSpPr>
+        <p:spPr>
+          <a:xfrm>
+            <a:off x="463184" y="5370847"/>
+            <a:ext cx="1615076" cy="369332"/>
+          </a:xfrm>
+          <a:prstGeom prst="rect">
+            <a:avLst/>
+          </a:prstGeom>
+          <a:noFill/>
+        </p:spPr>
+        <p:txBody>
+          <a:bodyPr wrap="square" rtlCol="0">
+            <a:spAutoFit/>
+          </a:bodyPr>
+          <a:lstStyle/>
+          <a:p>
+            <a:r>
+              <a:rPr lang="en-US" dirty="0"/>
+              <a:t>New State G:</a:t>
+            </a:r>
+          </a:p>
+        </p:txBody>
+      </p:sp>
+      <p:sp>
+        <p:nvSpPr>
+          <p:cNvPr id="13" name="TextBox 12">
+            <a:extLst>
+              <a:ext uri="{FF2B5EF4-FFF2-40B4-BE49-F238E27FC236}">
+                <a16:creationId xmlns:a16="http://schemas.microsoft.com/office/drawing/2014/main" id="{EBD817BC-8369-E577-E037-D95E1CE8AD74}"/>
+              </a:ext>
+            </a:extLst>
+          </p:cNvPr>
+          <p:cNvSpPr txBox="1"/>
+          <p:nvPr/>
+        </p:nvSpPr>
+        <p:spPr>
+          <a:xfrm>
+            <a:off x="463184" y="6075768"/>
+            <a:ext cx="1448897" cy="369332"/>
+          </a:xfrm>
+          <a:prstGeom prst="rect">
+            <a:avLst/>
+          </a:prstGeom>
+          <a:noFill/>
+        </p:spPr>
+        <p:txBody>
+          <a:bodyPr wrap="square" rtlCol="0">
+            <a:spAutoFit/>
+          </a:bodyPr>
+          <a:lstStyle/>
+          <a:p>
+            <a:r>
+              <a:rPr lang="en-US" dirty="0"/>
+              <a:t>New State H:</a:t>
+            </a:r>
+          </a:p>
+        </p:txBody>
+      </p:sp>
     </p:spTree>
     <p:extLst>
       <p:ext uri="{BB962C8B-B14F-4D97-AF65-F5344CB8AC3E}">
@@ -4370,6 +4651,89 @@
 </file>
 
 <file path=ppt/slides/slide15.xml><?xml version="1.0" encoding="utf-8"?>
+<p:sld xmlns:a="http://schemas.openxmlformats.org/drawingml/2006/main" xmlns:r="http://schemas.openxmlformats.org/officeDocument/2006/relationships" xmlns:p="http://schemas.openxmlformats.org/presentationml/2006/main">
+  <p:cSld>
+    <p:spTree>
+      <p:nvGrpSpPr>
+        <p:cNvPr id="1" name=""/>
+        <p:cNvGrpSpPr/>
+        <p:nvPr/>
+      </p:nvGrpSpPr>
+      <p:grpSpPr>
+        <a:xfrm>
+          <a:off x="0" y="0"/>
+          <a:ext cx="0" cy="0"/>
+          <a:chOff x="0" y="0"/>
+          <a:chExt cx="0" cy="0"/>
+        </a:xfrm>
+      </p:grpSpPr>
+      <p:sp>
+        <p:nvSpPr>
+          <p:cNvPr id="2" name="Title 1">
+            <a:extLst>
+              <a:ext uri="{FF2B5EF4-FFF2-40B4-BE49-F238E27FC236}">
+                <a16:creationId xmlns:a16="http://schemas.microsoft.com/office/drawing/2014/main" id="{1ED014FD-B936-EB81-CAE1-C6C83F780AEA}"/>
+              </a:ext>
+            </a:extLst>
+          </p:cNvPr>
+          <p:cNvSpPr>
+            <a:spLocks noGrp="1"/>
+          </p:cNvSpPr>
+          <p:nvPr>
+            <p:ph type="title"/>
+          </p:nvPr>
+        </p:nvSpPr>
+        <p:spPr/>
+        <p:txBody>
+          <a:bodyPr/>
+          <a:lstStyle/>
+          <a:p>
+            <a:r>
+              <a:rPr lang="en-US"/>
+              <a:t>CORA CONCLUSION GOES HERE</a:t>
+            </a:r>
+          </a:p>
+        </p:txBody>
+      </p:sp>
+      <p:sp>
+        <p:nvSpPr>
+          <p:cNvPr id="3" name="Content Placeholder 2">
+            <a:extLst>
+              <a:ext uri="{FF2B5EF4-FFF2-40B4-BE49-F238E27FC236}">
+                <a16:creationId xmlns:a16="http://schemas.microsoft.com/office/drawing/2014/main" id="{21F2F1E6-F7AA-3300-FDBC-005A86F22A8F}"/>
+              </a:ext>
+            </a:extLst>
+          </p:cNvPr>
+          <p:cNvSpPr>
+            <a:spLocks noGrp="1"/>
+          </p:cNvSpPr>
+          <p:nvPr>
+            <p:ph idx="1"/>
+          </p:nvPr>
+        </p:nvSpPr>
+        <p:spPr/>
+        <p:txBody>
+          <a:bodyPr/>
+          <a:lstStyle/>
+          <a:p>
+            <a:endParaRPr lang="en-US"/>
+          </a:p>
+        </p:txBody>
+      </p:sp>
+    </p:spTree>
+    <p:extLst>
+      <p:ext uri="{BB962C8B-B14F-4D97-AF65-F5344CB8AC3E}">
+        <p14:creationId xmlns:p14="http://schemas.microsoft.com/office/powerpoint/2010/main" val="2517120381"/>
+      </p:ext>
+    </p:extLst>
+  </p:cSld>
+  <p:clrMapOvr>
+    <a:masterClrMapping/>
+  </p:clrMapOvr>
+</p:sld>
+</file>
+
+<file path=ppt/slides/slide16.xml><?xml version="1.0" encoding="utf-8"?>
 <p:sld xmlns:a="http://schemas.openxmlformats.org/drawingml/2006/main" xmlns:r="http://schemas.openxmlformats.org/officeDocument/2006/relationships" xmlns:p="http://schemas.openxmlformats.org/presentationml/2006/main">
   <p:cSld>
     <p:bg>

</xml_diff>